<commit_message>
TinyButStrong 3.10.1 and OpenTBS 1.9.10
</commit_message>
<xml_diff>
--- a/demo_opentbs/demo_ms_powerpoint.pptx
+++ b/demo_opentbs/demo_ms_powerpoint.pptx
@@ -355,12 +355,12 @@
         </c:dLbls>
         <c:gapWidth val="150"/>
         <c:shape val="cylinder"/>
-        <c:axId val="61990016"/>
-        <c:axId val="61991552"/>
+        <c:axId val="109867008"/>
+        <c:axId val="109868544"/>
         <c:axId val="0"/>
       </c:bar3DChart>
       <c:catAx>
-        <c:axId val="61990016"/>
+        <c:axId val="109867008"/>
         <c:scaling>
           <c:orientation val="minMax"/>
         </c:scaling>
@@ -379,7 +379,7 @@
             <a:endParaRPr lang="fr-FR"/>
           </a:p>
         </c:txPr>
-        <c:crossAx val="61991552"/>
+        <c:crossAx val="109868544"/>
         <c:crosses val="autoZero"/>
         <c:auto val="1"/>
         <c:lblAlgn val="ctr"/>
@@ -387,7 +387,7 @@
         <c:noMultiLvlLbl val="0"/>
       </c:catAx>
       <c:valAx>
-        <c:axId val="61991552"/>
+        <c:axId val="109868544"/>
         <c:scaling>
           <c:orientation val="minMax"/>
           <c:max val="5"/>
@@ -400,7 +400,7 @@
         <c:majorTickMark val="out"/>
         <c:minorTickMark val="none"/>
         <c:tickLblPos val="nextTo"/>
-        <c:crossAx val="61990016"/>
+        <c:crossAx val="109867008"/>
         <c:crosses val="autoZero"/>
         <c:crossBetween val="between"/>
         <c:majorUnit val="0.5"/>
@@ -623,7 +623,7 @@
               <a:pPr>
                 <a:defRPr/>
               </a:pPr>
-              <a:t>22/07/2014</a:t>
+              <a:t>25/03/2016</a:t>
             </a:fld>
             <a:endParaRPr lang="fr-FR"/>
           </a:p>
@@ -815,7 +815,7 @@
               <a:pPr>
                 <a:defRPr/>
               </a:pPr>
-              <a:t>22/07/2014</a:t>
+              <a:t>25/03/2016</a:t>
             </a:fld>
             <a:endParaRPr lang="fr-FR"/>
           </a:p>
@@ -1017,7 +1017,7 @@
               <a:pPr>
                 <a:defRPr/>
               </a:pPr>
-              <a:t>22/07/2014</a:t>
+              <a:t>25/03/2016</a:t>
             </a:fld>
             <a:endParaRPr lang="fr-FR"/>
           </a:p>
@@ -1209,7 +1209,7 @@
               <a:pPr>
                 <a:defRPr/>
               </a:pPr>
-              <a:t>22/07/2014</a:t>
+              <a:t>25/03/2016</a:t>
             </a:fld>
             <a:endParaRPr lang="fr-FR"/>
           </a:p>
@@ -1477,7 +1477,7 @@
               <a:pPr>
                 <a:defRPr/>
               </a:pPr>
-              <a:t>22/07/2014</a:t>
+              <a:t>25/03/2016</a:t>
             </a:fld>
             <a:endParaRPr lang="fr-FR"/>
           </a:p>
@@ -1787,7 +1787,7 @@
               <a:pPr>
                 <a:defRPr/>
               </a:pPr>
-              <a:t>22/07/2014</a:t>
+              <a:t>25/03/2016</a:t>
             </a:fld>
             <a:endParaRPr lang="fr-FR"/>
           </a:p>
@@ -2231,7 +2231,7 @@
               <a:pPr>
                 <a:defRPr/>
               </a:pPr>
-              <a:t>22/07/2014</a:t>
+              <a:t>25/03/2016</a:t>
             </a:fld>
             <a:endParaRPr lang="fr-FR"/>
           </a:p>
@@ -2371,7 +2371,7 @@
               <a:pPr>
                 <a:defRPr/>
               </a:pPr>
-              <a:t>22/07/2014</a:t>
+              <a:t>25/03/2016</a:t>
             </a:fld>
             <a:endParaRPr lang="fr-FR"/>
           </a:p>
@@ -2488,7 +2488,7 @@
               <a:pPr>
                 <a:defRPr/>
               </a:pPr>
-              <a:t>22/07/2014</a:t>
+              <a:t>25/03/2016</a:t>
             </a:fld>
             <a:endParaRPr lang="fr-FR"/>
           </a:p>
@@ -2787,7 +2787,7 @@
               <a:pPr>
                 <a:defRPr/>
               </a:pPr>
-              <a:t>22/07/2014</a:t>
+              <a:t>25/03/2016</a:t>
             </a:fld>
             <a:endParaRPr lang="fr-FR"/>
           </a:p>
@@ -3065,7 +3065,7 @@
               <a:pPr>
                 <a:defRPr/>
               </a:pPr>
-              <a:t>22/07/2014</a:t>
+              <a:t>25/03/2016</a:t>
             </a:fld>
             <a:endParaRPr lang="fr-FR"/>
           </a:p>
@@ -3321,7 +3321,7 @@
               <a:pPr>
                 <a:defRPr/>
               </a:pPr>
-              <a:t>22/07/2014</a:t>
+              <a:t>25/03/2016</a:t>
             </a:fld>
             <a:endParaRPr lang="fr-FR"/>
           </a:p>
@@ -3857,7 +3857,7 @@
         </p:nvSpPr>
         <p:spPr>
           <a:xfrm>
-            <a:off x="685800" y="2130425"/>
+            <a:off x="611560" y="2276872"/>
             <a:ext cx="7772400" cy="2306638"/>
           </a:xfrm>
         </p:spPr>
@@ -3890,7 +3890,19 @@
             </a:br>
             <a:r>
               <a:rPr lang="fr-FR" sz="2000" noProof="1" smtClean="0"/>
-              <a:t>The current document has been generated at [onshow..now;frm=‘yyyy-mm-dd hh:nn:ss’]</a:t>
+              <a:t>The current document has been </a:t>
+            </a:r>
+            <a:r>
+              <a:rPr lang="fr-FR" sz="2000" noProof="1" smtClean="0"/>
+              <a:t>generated </a:t>
+            </a:r>
+            <a:r>
+              <a:rPr lang="fr-FR" sz="2000" noProof="1"/>
+              <a:t>at [onshow..now;frm='yyyy-mm-dd hh:nn:ss']</a:t>
+            </a:r>
+            <a:r>
+              <a:rPr lang="fr-FR" sz="2000" noProof="1" smtClean="0"/>
+              <a:t/>
             </a:r>
             <a:br>
               <a:rPr lang="fr-FR" sz="2000" noProof="1" smtClean="0"/>
@@ -3969,6 +3981,165 @@
                 </a:solidFill>
               </a:rPr>
               <a:t>There is a restriction specific to PowerPoint Presentations: it is not possible to multiply slides. But you can delete specific slides.</a:t>
+            </a:r>
+            <a:endParaRPr lang="en-US" sz="1200" dirty="0">
+              <a:solidFill>
+                <a:schemeClr val="accent2">
+                  <a:lumMod val="75000"/>
+                </a:schemeClr>
+              </a:solidFill>
+            </a:endParaRPr>
+          </a:p>
+        </p:txBody>
+      </p:sp>
+      <p:sp>
+        <p:nvSpPr>
+          <p:cNvPr id="4" name="Rectangle à coins arrondis 3"/>
+          <p:cNvSpPr/>
+          <p:nvPr/>
+        </p:nvSpPr>
+        <p:spPr>
+          <a:xfrm>
+            <a:off x="4355976" y="476672"/>
+            <a:ext cx="4320480" cy="1296144"/>
+          </a:xfrm>
+          <a:prstGeom prst="wedgeRoundRectCallout">
+            <a:avLst>
+              <a:gd name="adj1" fmla="val -49412"/>
+              <a:gd name="adj2" fmla="val 76777"/>
+              <a:gd name="adj3" fmla="val 16667"/>
+            </a:avLst>
+          </a:prstGeom>
+        </p:spPr>
+        <p:style>
+          <a:lnRef idx="2">
+            <a:schemeClr val="accent3">
+              <a:shade val="50000"/>
+            </a:schemeClr>
+          </a:lnRef>
+          <a:fillRef idx="1">
+            <a:schemeClr val="accent3"/>
+          </a:fillRef>
+          <a:effectRef idx="0">
+            <a:schemeClr val="accent3"/>
+          </a:effectRef>
+          <a:fontRef idx="minor">
+            <a:schemeClr val="lt1"/>
+          </a:fontRef>
+        </p:style>
+        <p:txBody>
+          <a:bodyPr rtlCol="0" anchor="ctr"/>
+          <a:lstStyle/>
+          <a:p>
+            <a:pPr algn="ctr"/>
+            <a:r>
+              <a:rPr lang="en-US" sz="1200" dirty="0">
+                <a:solidFill>
+                  <a:schemeClr val="accent2">
+                    <a:lumMod val="75000"/>
+                  </a:schemeClr>
+                </a:solidFill>
+              </a:rPr>
+              <a:t>Think to set all texts to "Tools </a:t>
+            </a:r>
+            <a:r>
+              <a:rPr lang="en-US" sz="1200" dirty="0" smtClean="0">
+                <a:solidFill>
+                  <a:schemeClr val="accent2">
+                    <a:lumMod val="75000"/>
+                  </a:schemeClr>
+                </a:solidFill>
+              </a:rPr>
+              <a:t>&gt; </a:t>
+            </a:r>
+            <a:r>
+              <a:rPr lang="en-US" sz="1200" dirty="0">
+                <a:solidFill>
+                  <a:schemeClr val="accent2">
+                    <a:lumMod val="75000"/>
+                  </a:schemeClr>
+                </a:solidFill>
+              </a:rPr>
+              <a:t>Language </a:t>
+            </a:r>
+            <a:r>
+              <a:rPr lang="en-US" sz="1200" dirty="0" smtClean="0">
+                <a:solidFill>
+                  <a:schemeClr val="accent2">
+                    <a:lumMod val="75000"/>
+                  </a:schemeClr>
+                </a:solidFill>
+              </a:rPr>
+              <a:t>&gt; </a:t>
+            </a:r>
+            <a:r>
+              <a:rPr lang="en-US" sz="1200" dirty="0">
+                <a:solidFill>
+                  <a:schemeClr val="accent2">
+                    <a:lumMod val="75000"/>
+                  </a:schemeClr>
+                </a:solidFill>
+              </a:rPr>
+              <a:t>No check" when you edit the PowerPoint presentation, otherwise some TBS fields can be split by XML tags about the language and spell checking</a:t>
+            </a:r>
+            <a:r>
+              <a:rPr lang="en-US" sz="1200" dirty="0" smtClean="0">
+                <a:solidFill>
+                  <a:schemeClr val="accent2">
+                    <a:lumMod val="75000"/>
+                  </a:schemeClr>
+                </a:solidFill>
+              </a:rPr>
+              <a:t>.</a:t>
+            </a:r>
+            <a:br>
+              <a:rPr lang="en-US" sz="1200" dirty="0" smtClean="0">
+                <a:solidFill>
+                  <a:schemeClr val="accent2">
+                    <a:lumMod val="75000"/>
+                  </a:schemeClr>
+                </a:solidFill>
+              </a:rPr>
+            </a:br>
+            <a:endParaRPr lang="en-US" sz="1200" dirty="0" smtClean="0">
+              <a:solidFill>
+                <a:schemeClr val="accent2">
+                  <a:lumMod val="75000"/>
+                </a:schemeClr>
+              </a:solidFill>
+            </a:endParaRPr>
+          </a:p>
+          <a:p>
+            <a:pPr algn="ctr"/>
+            <a:r>
+              <a:rPr lang="en-US" sz="1200" dirty="0" smtClean="0">
+                <a:solidFill>
+                  <a:schemeClr val="accent2">
+                    <a:lumMod val="75000"/>
+                  </a:schemeClr>
+                </a:solidFill>
+              </a:rPr>
+              <a:t>If some TBS fields are not merged or raise an error, then you can cut the field and paste it back using </a:t>
+            </a:r>
+            <a:r>
+              <a:rPr lang="en-US" sz="1200" i="1" dirty="0" smtClean="0">
+                <a:solidFill>
+                  <a:schemeClr val="accent2">
+                    <a:lumMod val="75000"/>
+                  </a:schemeClr>
+                </a:solidFill>
+              </a:rPr>
+              <a:t>Paste / Keep Text Only</a:t>
+            </a:r>
+            <a:r>
+              <a:rPr lang="en-US" sz="1200" dirty="0" smtClean="0">
+                <a:solidFill>
+                  <a:schemeClr val="accent2">
+                    <a:lumMod val="75000"/>
+                  </a:schemeClr>
+                </a:solidFill>
+              </a:rPr>
+              <a:t>.</a:t>
             </a:r>
             <a:endParaRPr lang="en-US" sz="1200" dirty="0">
               <a:solidFill>

</xml_diff>